<commit_message>
Update diagram in PPT
Update diagram in PPT
</commit_message>
<xml_diff>
--- a/AsteRISK.pptx
+++ b/AsteRISK.pptx
@@ -117,6 +117,265 @@
     </p:ext>
   </p:extLst>
 </p:presentation>
+</file>
+
+<file path=ppt/changesInfos/changesInfo1.xml><?xml version="1.0" encoding="utf-8"?>
+<pc:chgInfo xmlns:a="http://schemas.openxmlformats.org/drawingml/2006/main" xmlns:r="http://schemas.openxmlformats.org/officeDocument/2006/relationships" xmlns:ac="http://schemas.microsoft.com/office/drawing/2013/main/command" xmlns:pc="http://schemas.microsoft.com/office/powerpoint/2013/main/command">
+  <pc:docChgLst>
+    <pc:chgData name="Dhruvi Pandya" userId="89edfcb87fa62997" providerId="LiveId" clId="{9EEB3621-609A-4435-8017-8BA7F0136AE2}"/>
+    <pc:docChg chg="undo custSel modSld">
+      <pc:chgData name="Dhruvi Pandya" userId="89edfcb87fa62997" providerId="LiveId" clId="{9EEB3621-609A-4435-8017-8BA7F0136AE2}" dt="2026-02-26T15:40:08.807" v="95" actId="1076"/>
+      <pc:docMkLst>
+        <pc:docMk/>
+      </pc:docMkLst>
+      <pc:sldChg chg="modSp mod">
+        <pc:chgData name="Dhruvi Pandya" userId="89edfcb87fa62997" providerId="LiveId" clId="{9EEB3621-609A-4435-8017-8BA7F0136AE2}" dt="2026-02-26T15:40:08.807" v="95" actId="1076"/>
+        <pc:sldMkLst>
+          <pc:docMk/>
+          <pc:sldMk cId="0" sldId="256"/>
+        </pc:sldMkLst>
+        <pc:spChg chg="mod">
+          <ac:chgData name="Dhruvi Pandya" userId="89edfcb87fa62997" providerId="LiveId" clId="{9EEB3621-609A-4435-8017-8BA7F0136AE2}" dt="2026-02-26T15:32:26.869" v="37" actId="1076"/>
+          <ac:spMkLst>
+            <pc:docMk/>
+            <pc:sldMk cId="0" sldId="256"/>
+            <ac:spMk id="3" creationId="{00000000-0000-0000-0000-000000000000}"/>
+          </ac:spMkLst>
+        </pc:spChg>
+        <pc:spChg chg="mod">
+          <ac:chgData name="Dhruvi Pandya" userId="89edfcb87fa62997" providerId="LiveId" clId="{9EEB3621-609A-4435-8017-8BA7F0136AE2}" dt="2026-02-26T15:31:26.019" v="22" actId="1076"/>
+          <ac:spMkLst>
+            <pc:docMk/>
+            <pc:sldMk cId="0" sldId="256"/>
+            <ac:spMk id="4" creationId="{00000000-0000-0000-0000-000000000000}"/>
+          </ac:spMkLst>
+        </pc:spChg>
+        <pc:spChg chg="mod">
+          <ac:chgData name="Dhruvi Pandya" userId="89edfcb87fa62997" providerId="LiveId" clId="{9EEB3621-609A-4435-8017-8BA7F0136AE2}" dt="2026-02-26T15:40:04.234" v="94" actId="1076"/>
+          <ac:spMkLst>
+            <pc:docMk/>
+            <pc:sldMk cId="0" sldId="256"/>
+            <ac:spMk id="13" creationId="{00000000-0000-0000-0000-000000000000}"/>
+          </ac:spMkLst>
+        </pc:spChg>
+        <pc:spChg chg="mod">
+          <ac:chgData name="Dhruvi Pandya" userId="89edfcb87fa62997" providerId="LiveId" clId="{9EEB3621-609A-4435-8017-8BA7F0136AE2}" dt="2026-02-26T15:40:08.807" v="95" actId="1076"/>
+          <ac:spMkLst>
+            <pc:docMk/>
+            <pc:sldMk cId="0" sldId="256"/>
+            <ac:spMk id="14" creationId="{00000000-0000-0000-0000-000000000000}"/>
+          </ac:spMkLst>
+        </pc:spChg>
+        <pc:spChg chg="mod">
+          <ac:chgData name="Dhruvi Pandya" userId="89edfcb87fa62997" providerId="LiveId" clId="{9EEB3621-609A-4435-8017-8BA7F0136AE2}" dt="2026-02-26T15:31:48.721" v="26" actId="1076"/>
+          <ac:spMkLst>
+            <pc:docMk/>
+            <pc:sldMk cId="0" sldId="256"/>
+            <ac:spMk id="15" creationId="{00000000-0000-0000-0000-000000000000}"/>
+          </ac:spMkLst>
+        </pc:spChg>
+        <pc:spChg chg="mod">
+          <ac:chgData name="Dhruvi Pandya" userId="89edfcb87fa62997" providerId="LiveId" clId="{9EEB3621-609A-4435-8017-8BA7F0136AE2}" dt="2026-02-26T15:32:14.133" v="33" actId="255"/>
+          <ac:spMkLst>
+            <pc:docMk/>
+            <pc:sldMk cId="0" sldId="256"/>
+            <ac:spMk id="16" creationId="{00000000-0000-0000-0000-000000000000}"/>
+          </ac:spMkLst>
+        </pc:spChg>
+        <pc:spChg chg="mod">
+          <ac:chgData name="Dhruvi Pandya" userId="89edfcb87fa62997" providerId="LiveId" clId="{9EEB3621-609A-4435-8017-8BA7F0136AE2}" dt="2026-02-26T15:39:52.990" v="92" actId="1076"/>
+          <ac:spMkLst>
+            <pc:docMk/>
+            <pc:sldMk cId="0" sldId="256"/>
+            <ac:spMk id="17" creationId="{00000000-0000-0000-0000-000000000000}"/>
+          </ac:spMkLst>
+        </pc:spChg>
+        <pc:spChg chg="mod">
+          <ac:chgData name="Dhruvi Pandya" userId="89edfcb87fa62997" providerId="LiveId" clId="{9EEB3621-609A-4435-8017-8BA7F0136AE2}" dt="2026-02-26T15:33:13.704" v="45" actId="122"/>
+          <ac:spMkLst>
+            <pc:docMk/>
+            <pc:sldMk cId="0" sldId="256"/>
+            <ac:spMk id="18" creationId="{00000000-0000-0000-0000-000000000000}"/>
+          </ac:spMkLst>
+        </pc:spChg>
+      </pc:sldChg>
+      <pc:sldChg chg="addSp delSp modSp mod">
+        <pc:chgData name="Dhruvi Pandya" userId="89edfcb87fa62997" providerId="LiveId" clId="{9EEB3621-609A-4435-8017-8BA7F0136AE2}" dt="2026-02-26T15:31:12.974" v="21" actId="14100"/>
+        <pc:sldMkLst>
+          <pc:docMk/>
+          <pc:sldMk cId="0" sldId="260"/>
+        </pc:sldMkLst>
+        <pc:spChg chg="add del">
+          <ac:chgData name="Dhruvi Pandya" userId="89edfcb87fa62997" providerId="LiveId" clId="{9EEB3621-609A-4435-8017-8BA7F0136AE2}" dt="2026-02-26T15:30:58.731" v="18" actId="478"/>
+          <ac:spMkLst>
+            <pc:docMk/>
+            <pc:sldMk cId="0" sldId="260"/>
+            <ac:spMk id="4" creationId="{00000000-0000-0000-0000-000000000000}"/>
+          </ac:spMkLst>
+        </pc:spChg>
+        <pc:spChg chg="del mod">
+          <ac:chgData name="Dhruvi Pandya" userId="89edfcb87fa62997" providerId="LiveId" clId="{9EEB3621-609A-4435-8017-8BA7F0136AE2}" dt="2026-02-26T15:30:47.377" v="16" actId="478"/>
+          <ac:spMkLst>
+            <pc:docMk/>
+            <pc:sldMk cId="0" sldId="260"/>
+            <ac:spMk id="5" creationId="{00000000-0000-0000-0000-000000000000}"/>
+          </ac:spMkLst>
+        </pc:spChg>
+        <pc:spChg chg="del">
+          <ac:chgData name="Dhruvi Pandya" userId="89edfcb87fa62997" providerId="LiveId" clId="{9EEB3621-609A-4435-8017-8BA7F0136AE2}" dt="2026-02-26T15:30:15.177" v="6" actId="478"/>
+          <ac:spMkLst>
+            <pc:docMk/>
+            <pc:sldMk cId="0" sldId="260"/>
+            <ac:spMk id="32" creationId="{00000000-0000-0000-0000-000000000000}"/>
+          </ac:spMkLst>
+        </pc:spChg>
+        <pc:spChg chg="del">
+          <ac:chgData name="Dhruvi Pandya" userId="89edfcb87fa62997" providerId="LiveId" clId="{9EEB3621-609A-4435-8017-8BA7F0136AE2}" dt="2026-02-26T15:30:17.063" v="7" actId="478"/>
+          <ac:spMkLst>
+            <pc:docMk/>
+            <pc:sldMk cId="0" sldId="260"/>
+            <ac:spMk id="33" creationId="{00000000-0000-0000-0000-000000000000}"/>
+          </ac:spMkLst>
+        </pc:spChg>
+        <pc:spChg chg="del">
+          <ac:chgData name="Dhruvi Pandya" userId="89edfcb87fa62997" providerId="LiveId" clId="{9EEB3621-609A-4435-8017-8BA7F0136AE2}" dt="2026-02-26T15:30:36.318" v="11" actId="478"/>
+          <ac:spMkLst>
+            <pc:docMk/>
+            <pc:sldMk cId="0" sldId="260"/>
+            <ac:spMk id="34" creationId="{00000000-0000-0000-0000-000000000000}"/>
+          </ac:spMkLst>
+        </pc:spChg>
+        <pc:spChg chg="del">
+          <ac:chgData name="Dhruvi Pandya" userId="89edfcb87fa62997" providerId="LiveId" clId="{9EEB3621-609A-4435-8017-8BA7F0136AE2}" dt="2026-02-26T15:30:00.228" v="1" actId="478"/>
+          <ac:spMkLst>
+            <pc:docMk/>
+            <pc:sldMk cId="0" sldId="260"/>
+            <ac:spMk id="35" creationId="{00000000-0000-0000-0000-000000000000}"/>
+          </ac:spMkLst>
+        </pc:spChg>
+        <pc:spChg chg="del mod">
+          <ac:chgData name="Dhruvi Pandya" userId="89edfcb87fa62997" providerId="LiveId" clId="{9EEB3621-609A-4435-8017-8BA7F0136AE2}" dt="2026-02-26T15:30:08.829" v="3" actId="478"/>
+          <ac:spMkLst>
+            <pc:docMk/>
+            <pc:sldMk cId="0" sldId="260"/>
+            <ac:spMk id="36" creationId="{00000000-0000-0000-0000-000000000000}"/>
+          </ac:spMkLst>
+        </pc:spChg>
+        <pc:spChg chg="del">
+          <ac:chgData name="Dhruvi Pandya" userId="89edfcb87fa62997" providerId="LiveId" clId="{9EEB3621-609A-4435-8017-8BA7F0136AE2}" dt="2026-02-26T15:30:10.475" v="4" actId="478"/>
+          <ac:spMkLst>
+            <pc:docMk/>
+            <pc:sldMk cId="0" sldId="260"/>
+            <ac:spMk id="37" creationId="{00000000-0000-0000-0000-000000000000}"/>
+          </ac:spMkLst>
+        </pc:spChg>
+        <pc:spChg chg="del">
+          <ac:chgData name="Dhruvi Pandya" userId="89edfcb87fa62997" providerId="LiveId" clId="{9EEB3621-609A-4435-8017-8BA7F0136AE2}" dt="2026-02-26T15:30:12.430" v="5" actId="478"/>
+          <ac:spMkLst>
+            <pc:docMk/>
+            <pc:sldMk cId="0" sldId="260"/>
+            <ac:spMk id="38" creationId="{00000000-0000-0000-0000-000000000000}"/>
+          </ac:spMkLst>
+        </pc:spChg>
+        <pc:spChg chg="del">
+          <ac:chgData name="Dhruvi Pandya" userId="89edfcb87fa62997" providerId="LiveId" clId="{9EEB3621-609A-4435-8017-8BA7F0136AE2}" dt="2026-02-26T15:30:19.640" v="8" actId="478"/>
+          <ac:spMkLst>
+            <pc:docMk/>
+            <pc:sldMk cId="0" sldId="260"/>
+            <ac:spMk id="40" creationId="{00000000-0000-0000-0000-000000000000}"/>
+          </ac:spMkLst>
+        </pc:spChg>
+        <pc:spChg chg="del">
+          <ac:chgData name="Dhruvi Pandya" userId="89edfcb87fa62997" providerId="LiveId" clId="{9EEB3621-609A-4435-8017-8BA7F0136AE2}" dt="2026-02-26T15:30:31.310" v="9" actId="478"/>
+          <ac:spMkLst>
+            <pc:docMk/>
+            <pc:sldMk cId="0" sldId="260"/>
+            <ac:spMk id="41" creationId="{00000000-0000-0000-0000-000000000000}"/>
+          </ac:spMkLst>
+        </pc:spChg>
+        <pc:spChg chg="del">
+          <ac:chgData name="Dhruvi Pandya" userId="89edfcb87fa62997" providerId="LiveId" clId="{9EEB3621-609A-4435-8017-8BA7F0136AE2}" dt="2026-02-26T15:30:33.310" v="10" actId="478"/>
+          <ac:spMkLst>
+            <pc:docMk/>
+            <pc:sldMk cId="0" sldId="260"/>
+            <ac:spMk id="42" creationId="{00000000-0000-0000-0000-000000000000}"/>
+          </ac:spMkLst>
+        </pc:spChg>
+        <pc:spChg chg="del">
+          <ac:chgData name="Dhruvi Pandya" userId="89edfcb87fa62997" providerId="LiveId" clId="{9EEB3621-609A-4435-8017-8BA7F0136AE2}" dt="2026-02-26T15:30:39.388" v="13" actId="478"/>
+          <ac:spMkLst>
+            <pc:docMk/>
+            <pc:sldMk cId="0" sldId="260"/>
+            <ac:spMk id="44" creationId="{00000000-0000-0000-0000-000000000000}"/>
+          </ac:spMkLst>
+        </pc:spChg>
+        <pc:spChg chg="del">
+          <ac:chgData name="Dhruvi Pandya" userId="89edfcb87fa62997" providerId="LiveId" clId="{9EEB3621-609A-4435-8017-8BA7F0136AE2}" dt="2026-02-26T15:30:37.483" v="12" actId="478"/>
+          <ac:spMkLst>
+            <pc:docMk/>
+            <pc:sldMk cId="0" sldId="260"/>
+            <ac:spMk id="45" creationId="{00000000-0000-0000-0000-000000000000}"/>
+          </ac:spMkLst>
+        </pc:spChg>
+        <pc:spChg chg="del">
+          <ac:chgData name="Dhruvi Pandya" userId="89edfcb87fa62997" providerId="LiveId" clId="{9EEB3621-609A-4435-8017-8BA7F0136AE2}" dt="2026-02-26T15:30:40.570" v="14" actId="478"/>
+          <ac:spMkLst>
+            <pc:docMk/>
+            <pc:sldMk cId="0" sldId="260"/>
+            <ac:spMk id="46" creationId="{00000000-0000-0000-0000-000000000000}"/>
+          </ac:spMkLst>
+        </pc:spChg>
+        <pc:spChg chg="del">
+          <ac:chgData name="Dhruvi Pandya" userId="89edfcb87fa62997" providerId="LiveId" clId="{9EEB3621-609A-4435-8017-8BA7F0136AE2}" dt="2026-02-26T15:30:00.228" v="1" actId="478"/>
+          <ac:spMkLst>
+            <pc:docMk/>
+            <pc:sldMk cId="0" sldId="260"/>
+            <ac:spMk id="50" creationId="{2A36C6F9-CF92-6E58-3146-D94C24B93A03}"/>
+          </ac:spMkLst>
+        </pc:spChg>
+        <pc:spChg chg="del">
+          <ac:chgData name="Dhruvi Pandya" userId="89edfcb87fa62997" providerId="LiveId" clId="{9EEB3621-609A-4435-8017-8BA7F0136AE2}" dt="2026-02-26T15:30:00.228" v="1" actId="478"/>
+          <ac:spMkLst>
+            <pc:docMk/>
+            <pc:sldMk cId="0" sldId="260"/>
+            <ac:spMk id="51" creationId="{527229A7-AAEB-4FB4-48F9-4A89B9A55EF9}"/>
+          </ac:spMkLst>
+        </pc:spChg>
+        <pc:picChg chg="add mod">
+          <ac:chgData name="Dhruvi Pandya" userId="89edfcb87fa62997" providerId="LiveId" clId="{9EEB3621-609A-4435-8017-8BA7F0136AE2}" dt="2026-02-26T15:31:12.974" v="21" actId="14100"/>
+          <ac:picMkLst>
+            <pc:docMk/>
+            <pc:sldMk cId="0" sldId="260"/>
+            <ac:picMk id="7" creationId="{BBD05FCC-23C8-0F41-521D-11B881F47753}"/>
+          </ac:picMkLst>
+        </pc:picChg>
+        <pc:picChg chg="del">
+          <ac:chgData name="Dhruvi Pandya" userId="89edfcb87fa62997" providerId="LiveId" clId="{9EEB3621-609A-4435-8017-8BA7F0136AE2}" dt="2026-02-26T15:29:51.973" v="0" actId="478"/>
+          <ac:picMkLst>
+            <pc:docMk/>
+            <pc:sldMk cId="0" sldId="260"/>
+            <ac:picMk id="53" creationId="{A8F02999-3C5C-23A3-0AC0-6394BBF8C2F2}"/>
+          </ac:picMkLst>
+        </pc:picChg>
+      </pc:sldChg>
+      <pc:sldChg chg="modSp mod">
+        <pc:chgData name="Dhruvi Pandya" userId="89edfcb87fa62997" providerId="LiveId" clId="{9EEB3621-609A-4435-8017-8BA7F0136AE2}" dt="2026-02-26T15:39:23.788" v="70" actId="20577"/>
+        <pc:sldMkLst>
+          <pc:docMk/>
+          <pc:sldMk cId="0" sldId="265"/>
+        </pc:sldMkLst>
+        <pc:spChg chg="mod">
+          <ac:chgData name="Dhruvi Pandya" userId="89edfcb87fa62997" providerId="LiveId" clId="{9EEB3621-609A-4435-8017-8BA7F0136AE2}" dt="2026-02-26T15:39:23.788" v="70" actId="20577"/>
+          <ac:spMkLst>
+            <pc:docMk/>
+            <pc:sldMk cId="0" sldId="265"/>
+            <ac:spMk id="14" creationId="{00000000-0000-0000-0000-000000000000}"/>
+          </ac:spMkLst>
+        </pc:spChg>
+      </pc:sldChg>
+    </pc:docChg>
+  </pc:docChgLst>
+</pc:chgInfo>
 </file>
 
 <file path=ppt/notesMasters/notesMaster1.xml><?xml version="1.0" encoding="utf-8"?>
@@ -1293,7 +1552,7 @@
         </p:nvSpPr>
         <p:spPr>
           <a:xfrm>
-            <a:off x="0" y="32004"/>
+            <a:off x="-74814" y="-77100"/>
             <a:ext cx="9098280" cy="5097780"/>
           </a:xfrm>
           <a:prstGeom prst="rect">
@@ -1325,7 +1584,7 @@
         </p:nvSpPr>
         <p:spPr>
           <a:xfrm>
-            <a:off x="3840480" y="32004"/>
+            <a:off x="8420793" y="32004"/>
             <a:ext cx="54864" cy="5097780"/>
           </a:xfrm>
           <a:prstGeom prst="rect">
@@ -1357,7 +1616,7 @@
         </p:nvSpPr>
         <p:spPr>
           <a:xfrm>
-            <a:off x="365760" y="914400"/>
+            <a:off x="2578609" y="939545"/>
             <a:ext cx="3200400" cy="822960"/>
           </a:xfrm>
           <a:prstGeom prst="rect">
@@ -1396,7 +1655,7 @@
         </p:nvSpPr>
         <p:spPr>
           <a:xfrm>
-            <a:off x="1812175" y="911075"/>
+            <a:off x="4027517" y="952014"/>
             <a:ext cx="3200400" cy="822960"/>
           </a:xfrm>
           <a:prstGeom prst="rect">
@@ -1435,7 +1694,7 @@
         </p:nvSpPr>
         <p:spPr>
           <a:xfrm>
-            <a:off x="731520" y="1783080"/>
+            <a:off x="2884517" y="1783080"/>
             <a:ext cx="2286000" cy="36576"/>
           </a:xfrm>
           <a:prstGeom prst="rect">
@@ -1467,8 +1726,8 @@
         </p:nvSpPr>
         <p:spPr>
           <a:xfrm>
-            <a:off x="438912" y="1860804"/>
-            <a:ext cx="3200400" cy="822960"/>
+            <a:off x="606829" y="1910679"/>
+            <a:ext cx="6932815" cy="822960"/>
           </a:xfrm>
           <a:prstGeom prst="rect">
             <a:avLst/>
@@ -1480,11 +1739,11 @@
           <a:bodyPr wrap="square" lIns="0" tIns="0" rIns="0" bIns="0" rtlCol="0" anchor="ctr"/>
           <a:lstStyle/>
           <a:p>
-            <a:pPr marL="0" indent="0">
+            <a:pPr marL="0" indent="0" algn="ctr">
               <a:buNone/>
             </a:pPr>
             <a:r>
-              <a:rPr lang="en-US" sz="2400" dirty="0">
+              <a:rPr lang="en-US" sz="2800" dirty="0">
                 <a:solidFill>
                   <a:srgbClr val="C8D8F0"/>
                 </a:solidFill>
@@ -1494,14 +1753,12 @@
               </a:rPr>
               <a:t>AI-Powered Financial</a:t>
             </a:r>
-            <a:endParaRPr lang="en-US" sz="2400" dirty="0"/>
-          </a:p>
-          <a:p>
-            <a:pPr marL="0" indent="0">
-              <a:buNone/>
-            </a:pPr>
-            <a:r>
-              <a:rPr lang="en-US" sz="2400" dirty="0">
+            <a:r>
+              <a:rPr lang="en-US" sz="2800" dirty="0"/>
+              <a:t> </a:t>
+            </a:r>
+            <a:r>
+              <a:rPr lang="en-US" sz="2800" dirty="0">
                 <a:solidFill>
                   <a:srgbClr val="C8D8F0"/>
                 </a:solidFill>
@@ -1511,7 +1768,7 @@
               </a:rPr>
               <a:t>Contagion Risk Simulator</a:t>
             </a:r>
-            <a:endParaRPr lang="en-US" sz="2400" dirty="0"/>
+            <a:endParaRPr lang="en-US" sz="2800" dirty="0"/>
           </a:p>
         </p:txBody>
       </p:sp>
@@ -1523,8 +1780,8 @@
         </p:nvSpPr>
         <p:spPr>
           <a:xfrm>
-            <a:off x="438912" y="3132235"/>
-            <a:ext cx="3200400" cy="320040"/>
+            <a:off x="2352502" y="2711196"/>
+            <a:ext cx="3882044" cy="351627"/>
           </a:xfrm>
           <a:prstGeom prst="rect">
             <a:avLst/>
@@ -1536,8 +1793,9 @@
           <a:bodyPr wrap="square" lIns="0" tIns="0" rIns="0" bIns="0" rtlCol="0" anchor="ctr"/>
           <a:lstStyle/>
           <a:p>
-            <a:r>
-              <a:rPr lang="en-US" sz="1400" dirty="0">
+            <a:pPr algn="ctr"/>
+            <a:r>
+              <a:rPr lang="en-US" sz="1600" dirty="0">
                 <a:solidFill>
                   <a:srgbClr val="00B4C8"/>
                 </a:solidFill>
@@ -1545,12 +1803,13 @@
                 <a:ea typeface="Calibri" pitchFamily="34" charset="-122"/>
                 <a:cs typeface="Calibri" pitchFamily="34" charset="-120"/>
               </a:rPr>
-              <a:t>DTCC AI Hackathon  ·  2026</a:t>
-            </a:r>
-          </a:p>
-          <a:p>
-            <a:r>
-              <a:rPr lang="en-US" sz="1400" dirty="0">
+              <a:t>DTCC Industry-Powered  AI Hackathon  ·  2026</a:t>
+            </a:r>
+          </a:p>
+          <a:p>
+            <a:pPr algn="ctr"/>
+            <a:r>
+              <a:rPr lang="en-US" sz="1600" dirty="0">
                 <a:solidFill>
                   <a:srgbClr val="00B4C8"/>
                 </a:solidFill>
@@ -1558,14 +1817,14 @@
                 <a:ea typeface="Calibri" pitchFamily="34" charset="-122"/>
                 <a:cs typeface="Calibri" pitchFamily="34" charset="-120"/>
               </a:rPr>
-              <a:t>Generative</a:t>
-            </a:r>
-            <a:r>
-              <a:rPr lang="en-US" sz="1400" dirty="0"/>
+              <a:t>Track - Generative</a:t>
+            </a:r>
+            <a:r>
+              <a:rPr lang="en-US" sz="1600" dirty="0"/>
               <a:t> </a:t>
             </a:r>
             <a:r>
-              <a:rPr lang="en-US" sz="1400" dirty="0">
+              <a:rPr lang="en-US" sz="1600" dirty="0">
                 <a:solidFill>
                   <a:srgbClr val="00B4C8"/>
                 </a:solidFill>
@@ -1576,11 +1835,11 @@
               <a:t>AI</a:t>
             </a:r>
             <a:r>
-              <a:rPr lang="en-US" sz="1400" dirty="0"/>
+              <a:rPr lang="en-US" sz="1600" dirty="0"/>
               <a:t> </a:t>
             </a:r>
             <a:r>
-              <a:rPr lang="en-US" sz="1400" dirty="0">
+              <a:rPr lang="en-US" sz="1600" dirty="0">
                 <a:solidFill>
                   <a:srgbClr val="00B4C8"/>
                 </a:solidFill>
@@ -1591,11 +1850,11 @@
               <a:t>for</a:t>
             </a:r>
             <a:r>
-              <a:rPr lang="en-US" sz="1400" dirty="0"/>
+              <a:rPr lang="en-US" sz="1600" dirty="0"/>
               <a:t> </a:t>
             </a:r>
             <a:r>
-              <a:rPr lang="en-US" sz="1400" dirty="0">
+              <a:rPr lang="en-US" sz="1600" dirty="0">
                 <a:solidFill>
                   <a:srgbClr val="00B4C8"/>
                 </a:solidFill>
@@ -1616,8 +1875,8 @@
         </p:nvSpPr>
         <p:spPr>
           <a:xfrm>
-            <a:off x="365760" y="3850871"/>
-            <a:ext cx="3246120" cy="822960"/>
+            <a:off x="120535" y="3850871"/>
+            <a:ext cx="7867996" cy="822960"/>
           </a:xfrm>
           <a:prstGeom prst="rect">
             <a:avLst/>
@@ -1629,8 +1888,9 @@
           <a:bodyPr wrap="square" lIns="0" tIns="0" rIns="0" bIns="0" rtlCol="0" anchor="ctr"/>
           <a:lstStyle/>
           <a:p>
-            <a:r>
-              <a:rPr lang="en-US" sz="1200" dirty="0">
+            <a:pPr algn="ctr"/>
+            <a:r>
+              <a:rPr lang="en-US" dirty="0">
                 <a:solidFill>
                   <a:srgbClr val="7A9AC0"/>
                 </a:solidFill>
@@ -1641,11 +1901,11 @@
               <a:t>Arunava Roy  ·  Atif Hussain  ·  Sibananda Patnaik  ·  Dhruvi Pandya</a:t>
             </a:r>
             <a:r>
-              <a:rPr lang="en-US" sz="1200" dirty="0"/>
+              <a:rPr lang="en-US" dirty="0"/>
               <a:t> </a:t>
             </a:r>
             <a:r>
-              <a:rPr lang="en-US" sz="1200" dirty="0">
+              <a:rPr lang="en-US" dirty="0">
                 <a:solidFill>
                   <a:srgbClr val="7A9AC0"/>
                 </a:solidFill>
@@ -1656,11 +1916,11 @@
               <a:t>· </a:t>
             </a:r>
             <a:r>
-              <a:rPr lang="en-US" sz="1200" dirty="0"/>
+              <a:rPr lang="en-US" dirty="0"/>
               <a:t> </a:t>
             </a:r>
             <a:r>
-              <a:rPr lang="en-US" sz="1200" dirty="0">
+              <a:rPr lang="en-US" dirty="0">
                 <a:solidFill>
                   <a:srgbClr val="7A9AC0"/>
                 </a:solidFill>
@@ -1670,7 +1930,7 @@
               </a:rPr>
               <a:t>Femi Javia  ·  Harshit Sharma  ·  Pulkit Rajpal  ·  Thorfinn Manison</a:t>
             </a:r>
-            <a:endParaRPr lang="en-US" sz="1200" dirty="0"/>
+            <a:endParaRPr lang="en-US" dirty="0"/>
           </a:p>
         </p:txBody>
       </p:sp>
@@ -3843,96 +4103,6 @@
       </p:grpSpPr>
       <p:sp>
         <p:nvSpPr>
-          <p:cNvPr id="51" name="Shape 33">
-            <a:extLst>
-              <a:ext uri="{FF2B5EF4-FFF2-40B4-BE49-F238E27FC236}">
-                <a16:creationId xmlns:a16="http://schemas.microsoft.com/office/drawing/2014/main" id="{527229A7-AAEB-4FB4-48F9-4A89B9A55EF9}"/>
-              </a:ext>
-            </a:extLst>
-          </p:cNvPr>
-          <p:cNvSpPr/>
-          <p:nvPr/>
-        </p:nvSpPr>
-        <p:spPr>
-          <a:xfrm>
-            <a:off x="6870467" y="3584864"/>
-            <a:ext cx="1907771" cy="884682"/>
-          </a:xfrm>
-          <a:prstGeom prst="rect">
-            <a:avLst/>
-          </a:prstGeom>
-          <a:solidFill>
-            <a:srgbClr val="FFFFFF"/>
-          </a:solidFill>
-          <a:ln w="9525">
-            <a:solidFill>
-              <a:srgbClr val="D0DCF0"/>
-            </a:solidFill>
-            <a:prstDash val="solid"/>
-          </a:ln>
-          <a:effectLst>
-            <a:outerShdw blurRad="101600" dist="25400" dir="8100000" algn="bl" rotWithShape="0">
-              <a:srgbClr val="4A6080">
-                <a:alpha val="12000"/>
-              </a:srgbClr>
-            </a:outerShdw>
-          </a:effectLst>
-        </p:spPr>
-        <p:txBody>
-          <a:bodyPr/>
-          <a:lstStyle/>
-          <a:p>
-            <a:endParaRPr lang="en-US"/>
-          </a:p>
-        </p:txBody>
-      </p:sp>
-      <p:sp>
-        <p:nvSpPr>
-          <p:cNvPr id="50" name="Shape 33">
-            <a:extLst>
-              <a:ext uri="{FF2B5EF4-FFF2-40B4-BE49-F238E27FC236}">
-                <a16:creationId xmlns:a16="http://schemas.microsoft.com/office/drawing/2014/main" id="{2A36C6F9-CF92-6E58-3146-D94C24B93A03}"/>
-              </a:ext>
-            </a:extLst>
-          </p:cNvPr>
-          <p:cNvSpPr/>
-          <p:nvPr/>
-        </p:nvSpPr>
-        <p:spPr>
-          <a:xfrm>
-            <a:off x="6870468" y="2152269"/>
-            <a:ext cx="1907771" cy="884682"/>
-          </a:xfrm>
-          <a:prstGeom prst="rect">
-            <a:avLst/>
-          </a:prstGeom>
-          <a:solidFill>
-            <a:srgbClr val="FFFFFF"/>
-          </a:solidFill>
-          <a:ln w="9525">
-            <a:solidFill>
-              <a:srgbClr val="D0DCF0"/>
-            </a:solidFill>
-            <a:prstDash val="solid"/>
-          </a:ln>
-          <a:effectLst>
-            <a:outerShdw blurRad="101600" dist="25400" dir="8100000" algn="bl" rotWithShape="0">
-              <a:srgbClr val="4A6080">
-                <a:alpha val="12000"/>
-              </a:srgbClr>
-            </a:outerShdw>
-          </a:effectLst>
-        </p:spPr>
-        <p:txBody>
-          <a:bodyPr/>
-          <a:lstStyle/>
-          <a:p>
-            <a:endParaRPr lang="en-US"/>
-          </a:p>
-        </p:txBody>
-      </p:sp>
-      <p:sp>
-        <p:nvSpPr>
           <p:cNvPr id="2" name="Shape 0"/>
           <p:cNvSpPr/>
           <p:nvPr/>
@@ -4036,552 +4206,6 @@
       </p:sp>
       <p:sp>
         <p:nvSpPr>
-          <p:cNvPr id="5" name="Text 3"/>
-          <p:cNvSpPr/>
-          <p:nvPr/>
-        </p:nvSpPr>
-        <p:spPr>
-          <a:xfrm>
-            <a:off x="457200" y="658368"/>
-            <a:ext cx="4322618" cy="274320"/>
-          </a:xfrm>
-          <a:prstGeom prst="rect">
-            <a:avLst/>
-          </a:prstGeom>
-          <a:noFill/>
-          <a:ln/>
-        </p:spPr>
-        <p:txBody>
-          <a:bodyPr wrap="square" lIns="0" tIns="0" rIns="0" bIns="0" rtlCol="0" anchor="ctr"/>
-          <a:lstStyle/>
-          <a:p>
-            <a:pPr marL="0" indent="0">
-              <a:buNone/>
-            </a:pPr>
-            <a:r>
-              <a:rPr lang="en-US" sz="1200" dirty="0">
-                <a:solidFill>
-                  <a:srgbClr val="0077A8"/>
-                </a:solidFill>
-                <a:latin typeface="Calibri" pitchFamily="34" charset="0"/>
-                <a:ea typeface="Calibri" pitchFamily="34" charset="-122"/>
-                <a:cs typeface="Calibri" pitchFamily="34" charset="-120"/>
-              </a:rPr>
-              <a:t>Three-layer pipeline: LLM → Contagion Engine → React Dashboard</a:t>
-            </a:r>
-            <a:endParaRPr lang="en-US" sz="1200" dirty="0"/>
-          </a:p>
-        </p:txBody>
-      </p:sp>
-      <p:sp>
-        <p:nvSpPr>
-          <p:cNvPr id="32" name="Text 30"/>
-          <p:cNvSpPr/>
-          <p:nvPr/>
-        </p:nvSpPr>
-        <p:spPr>
-          <a:xfrm>
-            <a:off x="6870469" y="467279"/>
-            <a:ext cx="2743200" cy="274320"/>
-          </a:xfrm>
-          <a:prstGeom prst="rect">
-            <a:avLst/>
-          </a:prstGeom>
-          <a:noFill/>
-          <a:ln/>
-        </p:spPr>
-        <p:txBody>
-          <a:bodyPr wrap="square" lIns="0" tIns="0" rIns="0" bIns="0" rtlCol="0" anchor="ctr"/>
-          <a:lstStyle/>
-          <a:p>
-            <a:pPr marL="0" indent="0">
-              <a:buNone/>
-            </a:pPr>
-            <a:r>
-              <a:rPr lang="en-US" sz="1000" b="1" kern="0" spc="200" dirty="0">
-                <a:solidFill>
-                  <a:srgbClr val="B8860B"/>
-                </a:solidFill>
-                <a:latin typeface="Calibri" pitchFamily="34" charset="0"/>
-                <a:ea typeface="Calibri" pitchFamily="34" charset="-122"/>
-                <a:cs typeface="Calibri" pitchFamily="34" charset="-120"/>
-              </a:rPr>
-              <a:t>INFRASTRUCTURE</a:t>
-            </a:r>
-            <a:endParaRPr lang="en-US" sz="1000" dirty="0"/>
-          </a:p>
-        </p:txBody>
-      </p:sp>
-      <p:sp>
-        <p:nvSpPr>
-          <p:cNvPr id="33" name="Text 31"/>
-          <p:cNvSpPr/>
-          <p:nvPr/>
-        </p:nvSpPr>
-        <p:spPr>
-          <a:xfrm>
-            <a:off x="6870469" y="1850517"/>
-            <a:ext cx="2286000" cy="274320"/>
-          </a:xfrm>
-          <a:prstGeom prst="rect">
-            <a:avLst/>
-          </a:prstGeom>
-          <a:noFill/>
-          <a:ln/>
-        </p:spPr>
-        <p:txBody>
-          <a:bodyPr wrap="square" lIns="0" tIns="0" rIns="0" bIns="0" rtlCol="0" anchor="ctr"/>
-          <a:lstStyle/>
-          <a:p>
-            <a:pPr marL="0" indent="0">
-              <a:buNone/>
-            </a:pPr>
-            <a:r>
-              <a:rPr lang="en-US" sz="1000" b="1" kern="0" spc="200" dirty="0">
-                <a:solidFill>
-                  <a:srgbClr val="0077A8"/>
-                </a:solidFill>
-                <a:latin typeface="Calibri" pitchFamily="34" charset="0"/>
-                <a:ea typeface="Calibri" pitchFamily="34" charset="-122"/>
-                <a:cs typeface="Calibri" pitchFamily="34" charset="-120"/>
-              </a:rPr>
-              <a:t>BACKEND</a:t>
-            </a:r>
-            <a:endParaRPr lang="en-US" sz="1000" dirty="0"/>
-          </a:p>
-        </p:txBody>
-      </p:sp>
-      <p:sp>
-        <p:nvSpPr>
-          <p:cNvPr id="34" name="Text 32"/>
-          <p:cNvSpPr/>
-          <p:nvPr/>
-        </p:nvSpPr>
-        <p:spPr>
-          <a:xfrm>
-            <a:off x="6870468" y="3250328"/>
-            <a:ext cx="2286000" cy="274320"/>
-          </a:xfrm>
-          <a:prstGeom prst="rect">
-            <a:avLst/>
-          </a:prstGeom>
-          <a:noFill/>
-          <a:ln/>
-        </p:spPr>
-        <p:txBody>
-          <a:bodyPr wrap="square" lIns="0" tIns="0" rIns="0" bIns="0" rtlCol="0" anchor="ctr"/>
-          <a:lstStyle/>
-          <a:p>
-            <a:pPr marL="0" indent="0">
-              <a:buNone/>
-            </a:pPr>
-            <a:r>
-              <a:rPr lang="en-US" sz="1000" b="1" kern="0" spc="200" dirty="0">
-                <a:solidFill>
-                  <a:srgbClr val="5B3E8A"/>
-                </a:solidFill>
-                <a:latin typeface="Calibri" pitchFamily="34" charset="0"/>
-                <a:ea typeface="Calibri" pitchFamily="34" charset="-122"/>
-                <a:cs typeface="Calibri" pitchFamily="34" charset="-120"/>
-              </a:rPr>
-              <a:t>FRONTEND</a:t>
-            </a:r>
-            <a:endParaRPr lang="en-US" sz="1000" dirty="0"/>
-          </a:p>
-        </p:txBody>
-      </p:sp>
-      <p:sp>
-        <p:nvSpPr>
-          <p:cNvPr id="35" name="Shape 33"/>
-          <p:cNvSpPr/>
-          <p:nvPr/>
-        </p:nvSpPr>
-        <p:spPr>
-          <a:xfrm>
-            <a:off x="6870469" y="869096"/>
-            <a:ext cx="1907771" cy="884682"/>
-          </a:xfrm>
-          <a:prstGeom prst="rect">
-            <a:avLst/>
-          </a:prstGeom>
-          <a:solidFill>
-            <a:srgbClr val="FFFFFF"/>
-          </a:solidFill>
-          <a:ln w="9525">
-            <a:solidFill>
-              <a:srgbClr val="D0DCF0"/>
-            </a:solidFill>
-            <a:prstDash val="solid"/>
-          </a:ln>
-          <a:effectLst>
-            <a:outerShdw blurRad="101600" dist="25400" dir="8100000" algn="bl" rotWithShape="0">
-              <a:srgbClr val="4A6080">
-                <a:alpha val="12000"/>
-              </a:srgbClr>
-            </a:outerShdw>
-          </a:effectLst>
-        </p:spPr>
-        <p:txBody>
-          <a:bodyPr/>
-          <a:lstStyle/>
-          <a:p>
-            <a:endParaRPr lang="en-US"/>
-          </a:p>
-        </p:txBody>
-      </p:sp>
-      <p:sp>
-        <p:nvSpPr>
-          <p:cNvPr id="36" name="Text 34"/>
-          <p:cNvSpPr/>
-          <p:nvPr/>
-        </p:nvSpPr>
-        <p:spPr>
-          <a:xfrm>
-            <a:off x="7007629" y="872525"/>
-            <a:ext cx="2331720" cy="320040"/>
-          </a:xfrm>
-          <a:prstGeom prst="rect">
-            <a:avLst/>
-          </a:prstGeom>
-          <a:noFill/>
-          <a:ln/>
-        </p:spPr>
-        <p:txBody>
-          <a:bodyPr wrap="square" lIns="0" tIns="0" rIns="0" bIns="0" rtlCol="0" anchor="ctr"/>
-          <a:lstStyle/>
-          <a:p>
-            <a:pPr marL="0" indent="0">
-              <a:buNone/>
-            </a:pPr>
-            <a:r>
-              <a:rPr lang="en-US" sz="1100" dirty="0">
-                <a:solidFill>
-                  <a:srgbClr val="4A5E7A"/>
-                </a:solidFill>
-                <a:latin typeface="Calibri" pitchFamily="34" charset="0"/>
-                <a:ea typeface="Calibri" pitchFamily="34" charset="-122"/>
-                <a:cs typeface="Calibri" pitchFamily="34" charset="-120"/>
-              </a:rPr>
-              <a:t>▪  AWS Bedrock AgentCore</a:t>
-            </a:r>
-            <a:endParaRPr lang="en-US" sz="1100" dirty="0"/>
-          </a:p>
-        </p:txBody>
-      </p:sp>
-      <p:sp>
-        <p:nvSpPr>
-          <p:cNvPr id="37" name="Text 35"/>
-          <p:cNvSpPr/>
-          <p:nvPr/>
-        </p:nvSpPr>
-        <p:spPr>
-          <a:xfrm>
-            <a:off x="7007629" y="1146845"/>
-            <a:ext cx="2331720" cy="320040"/>
-          </a:xfrm>
-          <a:prstGeom prst="rect">
-            <a:avLst/>
-          </a:prstGeom>
-          <a:noFill/>
-          <a:ln/>
-        </p:spPr>
-        <p:txBody>
-          <a:bodyPr wrap="square" lIns="0" tIns="0" rIns="0" bIns="0" rtlCol="0" anchor="ctr"/>
-          <a:lstStyle/>
-          <a:p>
-            <a:pPr marL="0" indent="0">
-              <a:buNone/>
-            </a:pPr>
-            <a:r>
-              <a:rPr lang="en-US" sz="1100" dirty="0">
-                <a:solidFill>
-                  <a:srgbClr val="4A5E7A"/>
-                </a:solidFill>
-                <a:latin typeface="Calibri" pitchFamily="34" charset="0"/>
-                <a:ea typeface="Calibri" pitchFamily="34" charset="-122"/>
-                <a:cs typeface="Calibri" pitchFamily="34" charset="-120"/>
-              </a:rPr>
-              <a:t>▪  Docker + OpenTelemetry</a:t>
-            </a:r>
-            <a:endParaRPr lang="en-US" sz="1100" dirty="0"/>
-          </a:p>
-        </p:txBody>
-      </p:sp>
-      <p:sp>
-        <p:nvSpPr>
-          <p:cNvPr id="38" name="Text 36"/>
-          <p:cNvSpPr/>
-          <p:nvPr/>
-        </p:nvSpPr>
-        <p:spPr>
-          <a:xfrm>
-            <a:off x="7007629" y="1420594"/>
-            <a:ext cx="2331720" cy="320040"/>
-          </a:xfrm>
-          <a:prstGeom prst="rect">
-            <a:avLst/>
-          </a:prstGeom>
-          <a:noFill/>
-          <a:ln/>
-        </p:spPr>
-        <p:txBody>
-          <a:bodyPr wrap="square" lIns="0" tIns="0" rIns="0" bIns="0" rtlCol="0" anchor="ctr"/>
-          <a:lstStyle/>
-          <a:p>
-            <a:pPr marL="0" indent="0">
-              <a:buNone/>
-            </a:pPr>
-            <a:r>
-              <a:rPr lang="en-US" sz="1100" dirty="0">
-                <a:solidFill>
-                  <a:srgbClr val="4A5E7A"/>
-                </a:solidFill>
-                <a:latin typeface="Calibri" pitchFamily="34" charset="0"/>
-                <a:ea typeface="Calibri" pitchFamily="34" charset="-122"/>
-                <a:cs typeface="Calibri" pitchFamily="34" charset="-120"/>
-              </a:rPr>
-              <a:t>▪  LangGraph Pipeline</a:t>
-            </a:r>
-            <a:endParaRPr lang="en-US" sz="1100" dirty="0"/>
-          </a:p>
-        </p:txBody>
-      </p:sp>
-      <p:sp>
-        <p:nvSpPr>
-          <p:cNvPr id="40" name="Text 38"/>
-          <p:cNvSpPr/>
-          <p:nvPr/>
-        </p:nvSpPr>
-        <p:spPr>
-          <a:xfrm>
-            <a:off x="7007629" y="2133981"/>
-            <a:ext cx="2331720" cy="320040"/>
-          </a:xfrm>
-          <a:prstGeom prst="rect">
-            <a:avLst/>
-          </a:prstGeom>
-          <a:noFill/>
-          <a:ln/>
-        </p:spPr>
-        <p:txBody>
-          <a:bodyPr wrap="square" lIns="0" tIns="0" rIns="0" bIns="0" rtlCol="0" anchor="ctr"/>
-          <a:lstStyle/>
-          <a:p>
-            <a:pPr marL="0" indent="0">
-              <a:buNone/>
-            </a:pPr>
-            <a:r>
-              <a:rPr lang="en-US" sz="1100" dirty="0">
-                <a:solidFill>
-                  <a:srgbClr val="4A5E7A"/>
-                </a:solidFill>
-                <a:latin typeface="Calibri" pitchFamily="34" charset="0"/>
-                <a:ea typeface="Calibri" pitchFamily="34" charset="-122"/>
-                <a:cs typeface="Calibri" pitchFamily="34" charset="-120"/>
-              </a:rPr>
-              <a:t>▪  Python · LangGraph</a:t>
-            </a:r>
-            <a:endParaRPr lang="en-US" sz="1100" dirty="0"/>
-          </a:p>
-        </p:txBody>
-      </p:sp>
-      <p:sp>
-        <p:nvSpPr>
-          <p:cNvPr id="41" name="Text 39"/>
-          <p:cNvSpPr/>
-          <p:nvPr/>
-        </p:nvSpPr>
-        <p:spPr>
-          <a:xfrm>
-            <a:off x="7007629" y="2377492"/>
-            <a:ext cx="2331720" cy="320040"/>
-          </a:xfrm>
-          <a:prstGeom prst="rect">
-            <a:avLst/>
-          </a:prstGeom>
-          <a:noFill/>
-          <a:ln/>
-        </p:spPr>
-        <p:txBody>
-          <a:bodyPr wrap="square" lIns="0" tIns="0" rIns="0" bIns="0" rtlCol="0" anchor="ctr"/>
-          <a:lstStyle/>
-          <a:p>
-            <a:pPr marL="0" indent="0">
-              <a:buNone/>
-            </a:pPr>
-            <a:r>
-              <a:rPr lang="en-US" sz="1100" dirty="0">
-                <a:solidFill>
-                  <a:srgbClr val="4A5E7A"/>
-                </a:solidFill>
-                <a:latin typeface="Calibri" pitchFamily="34" charset="0"/>
-                <a:ea typeface="Calibri" pitchFamily="34" charset="-122"/>
-                <a:cs typeface="Calibri" pitchFamily="34" charset="-120"/>
-              </a:rPr>
-              <a:t>▪  NetworkX · NumPy · Pandas</a:t>
-            </a:r>
-            <a:endParaRPr lang="en-US" sz="1100" dirty="0"/>
-          </a:p>
-        </p:txBody>
-      </p:sp>
-      <p:sp>
-        <p:nvSpPr>
-          <p:cNvPr id="42" name="Text 40"/>
-          <p:cNvSpPr/>
-          <p:nvPr/>
-        </p:nvSpPr>
-        <p:spPr>
-          <a:xfrm>
-            <a:off x="7007629" y="2641473"/>
-            <a:ext cx="2331720" cy="320040"/>
-          </a:xfrm>
-          <a:prstGeom prst="rect">
-            <a:avLst/>
-          </a:prstGeom>
-          <a:noFill/>
-          <a:ln/>
-        </p:spPr>
-        <p:txBody>
-          <a:bodyPr wrap="square" lIns="0" tIns="0" rIns="0" bIns="0" rtlCol="0" anchor="ctr"/>
-          <a:lstStyle/>
-          <a:p>
-            <a:pPr marL="0" indent="0">
-              <a:buNone/>
-            </a:pPr>
-            <a:r>
-              <a:rPr lang="en-US" sz="1100" dirty="0">
-                <a:solidFill>
-                  <a:srgbClr val="4A5E7A"/>
-                </a:solidFill>
-                <a:latin typeface="Calibri" pitchFamily="34" charset="0"/>
-                <a:ea typeface="Calibri" pitchFamily="34" charset="-122"/>
-                <a:cs typeface="Calibri" pitchFamily="34" charset="-120"/>
-              </a:rPr>
-              <a:t>▪  SIR Simulation Engine</a:t>
-            </a:r>
-            <a:endParaRPr lang="en-US" sz="1100" dirty="0"/>
-          </a:p>
-        </p:txBody>
-      </p:sp>
-      <p:sp>
-        <p:nvSpPr>
-          <p:cNvPr id="44" name="Text 42"/>
-          <p:cNvSpPr/>
-          <p:nvPr/>
-        </p:nvSpPr>
-        <p:spPr>
-          <a:xfrm>
-            <a:off x="7007629" y="3603048"/>
-            <a:ext cx="2331720" cy="320040"/>
-          </a:xfrm>
-          <a:prstGeom prst="rect">
-            <a:avLst/>
-          </a:prstGeom>
-          <a:noFill/>
-          <a:ln/>
-        </p:spPr>
-        <p:txBody>
-          <a:bodyPr wrap="square" lIns="0" tIns="0" rIns="0" bIns="0" rtlCol="0" anchor="ctr"/>
-          <a:lstStyle/>
-          <a:p>
-            <a:pPr marL="0" indent="0">
-              <a:buNone/>
-            </a:pPr>
-            <a:r>
-              <a:rPr lang="en-US" sz="1100" dirty="0">
-                <a:solidFill>
-                  <a:srgbClr val="4A5E7A"/>
-                </a:solidFill>
-                <a:latin typeface="Calibri" pitchFamily="34" charset="0"/>
-                <a:ea typeface="Calibri" pitchFamily="34" charset="-122"/>
-                <a:cs typeface="Calibri" pitchFamily="34" charset="-120"/>
-              </a:rPr>
-              <a:t>▪  React · TypeScript</a:t>
-            </a:r>
-            <a:endParaRPr lang="en-US" sz="1100" dirty="0"/>
-          </a:p>
-        </p:txBody>
-      </p:sp>
-      <p:sp>
-        <p:nvSpPr>
-          <p:cNvPr id="45" name="Text 43"/>
-          <p:cNvSpPr/>
-          <p:nvPr/>
-        </p:nvSpPr>
-        <p:spPr>
-          <a:xfrm>
-            <a:off x="7007629" y="3841572"/>
-            <a:ext cx="2331720" cy="320040"/>
-          </a:xfrm>
-          <a:prstGeom prst="rect">
-            <a:avLst/>
-          </a:prstGeom>
-          <a:noFill/>
-          <a:ln/>
-        </p:spPr>
-        <p:txBody>
-          <a:bodyPr wrap="square" lIns="0" tIns="0" rIns="0" bIns="0" rtlCol="0" anchor="ctr"/>
-          <a:lstStyle/>
-          <a:p>
-            <a:pPr marL="0" indent="0">
-              <a:buNone/>
-            </a:pPr>
-            <a:r>
-              <a:rPr lang="en-US" sz="1100" dirty="0">
-                <a:solidFill>
-                  <a:srgbClr val="4A5E7A"/>
-                </a:solidFill>
-                <a:latin typeface="Calibri" pitchFamily="34" charset="0"/>
-                <a:ea typeface="Calibri" pitchFamily="34" charset="-122"/>
-                <a:cs typeface="Calibri" pitchFamily="34" charset="-120"/>
-              </a:rPr>
-              <a:t>▪  D3.js · Recharts</a:t>
-            </a:r>
-            <a:endParaRPr lang="en-US" sz="1100" dirty="0"/>
-          </a:p>
-        </p:txBody>
-      </p:sp>
-      <p:sp>
-        <p:nvSpPr>
-          <p:cNvPr id="46" name="Text 44"/>
-          <p:cNvSpPr/>
-          <p:nvPr/>
-        </p:nvSpPr>
-        <p:spPr>
-          <a:xfrm>
-            <a:off x="6995160" y="4085914"/>
-            <a:ext cx="2331720" cy="320040"/>
-          </a:xfrm>
-          <a:prstGeom prst="rect">
-            <a:avLst/>
-          </a:prstGeom>
-          <a:noFill/>
-          <a:ln/>
-        </p:spPr>
-        <p:txBody>
-          <a:bodyPr wrap="square" lIns="0" tIns="0" rIns="0" bIns="0" rtlCol="0" anchor="ctr"/>
-          <a:lstStyle/>
-          <a:p>
-            <a:pPr marL="0" indent="0">
-              <a:buNone/>
-            </a:pPr>
-            <a:r>
-              <a:rPr lang="en-US" sz="1100" dirty="0">
-                <a:solidFill>
-                  <a:srgbClr val="4A5E7A"/>
-                </a:solidFill>
-                <a:latin typeface="Calibri" pitchFamily="34" charset="0"/>
-                <a:ea typeface="Calibri" pitchFamily="34" charset="-122"/>
-                <a:cs typeface="Calibri" pitchFamily="34" charset="-120"/>
-              </a:rPr>
-              <a:t>▪  TailwindCSS</a:t>
-            </a:r>
-            <a:endParaRPr lang="en-US" sz="1100" dirty="0"/>
-          </a:p>
-        </p:txBody>
-      </p:sp>
-      <p:sp>
-        <p:nvSpPr>
           <p:cNvPr id="47" name="Shape 45"/>
           <p:cNvSpPr/>
           <p:nvPr/>
@@ -4685,10 +4309,10 @@
       </p:sp>
       <p:pic>
         <p:nvPicPr>
-          <p:cNvPr id="53" name="Picture 52">
+          <p:cNvPr id="7" name="Picture 6">
             <a:extLst>
               <a:ext uri="{FF2B5EF4-FFF2-40B4-BE49-F238E27FC236}">
-                <a16:creationId xmlns:a16="http://schemas.microsoft.com/office/drawing/2014/main" id="{A8F02999-3C5C-23A3-0AC0-6394BBF8C2F2}"/>
+                <a16:creationId xmlns:a16="http://schemas.microsoft.com/office/drawing/2014/main" id="{BBD05FCC-23C8-0F41-521D-11B881F47753}"/>
               </a:ext>
             </a:extLst>
           </p:cNvPr>
@@ -4705,8 +4329,8 @@
         </p:blipFill>
         <p:spPr>
           <a:xfrm>
-            <a:off x="224444" y="1473992"/>
-            <a:ext cx="6408859" cy="2367580"/>
+            <a:off x="199505" y="723886"/>
+            <a:ext cx="8921533" cy="4130734"/>
           </a:xfrm>
           <a:prstGeom prst="rect">
             <a:avLst/>
@@ -8250,7 +7874,7 @@
                 <a:ea typeface="Calibri" pitchFamily="34" charset="-122"/>
                 <a:cs typeface="Calibri" pitchFamily="34" charset="-120"/>
               </a:rPr>
-              <a:t>DTCC Gen AI Hackathon 2026</a:t>
+              <a:t>DTCC Industry-Powered  AI Hackathon 2026</a:t>
             </a:r>
             <a:endParaRPr lang="en-US" sz="1400" dirty="0"/>
           </a:p>

</xml_diff>